<commit_message>
add at 10/18 night
</commit_message>
<xml_diff>
--- a/backup.pptx
+++ b/backup.pptx
@@ -12,6 +12,8 @@
     <p:sldId id="270" r:id="rId6"/>
     <p:sldId id="274" r:id="rId7"/>
     <p:sldId id="283" r:id="rId8"/>
+    <p:sldId id="318" r:id="rId9"/>
+    <p:sldId id="380" r:id="rId10"/>
   </p:sldIdLst>
   <p:sldSz cx="12192000" cy="6858000"/>
   <p:notesSz cx="6858000" cy="9144000"/>
@@ -110,6 +112,11 @@
       </a:defRPr>
     </a:lvl9pPr>
   </p:defaultTextStyle>
+  <p:extLst>
+    <p:ext uri="{EFAFB233-063F-42B5-8137-9DF3F51BA10A}">
+      <p15:sldGuideLst xmlns:p15="http://schemas.microsoft.com/office/powerpoint/2012/main"/>
+    </p:ext>
+  </p:extLst>
 </p:presentation>
 </file>
 
@@ -7459,6 +7466,1087 @@
 </p:sld>
 </file>
 
+<file path=ppt/slides/slide8.xml><?xml version="1.0" encoding="utf-8"?>
+<p:sld xmlns:a="http://schemas.openxmlformats.org/drawingml/2006/main" xmlns:r="http://schemas.openxmlformats.org/officeDocument/2006/relationships" xmlns:p="http://schemas.openxmlformats.org/presentationml/2006/main">
+  <p:cSld>
+    <p:spTree>
+      <p:nvGrpSpPr>
+        <p:cNvPr id="1" name=""/>
+        <p:cNvGrpSpPr/>
+        <p:nvPr/>
+      </p:nvGrpSpPr>
+      <p:grpSpPr>
+        <a:xfrm>
+          <a:off x="0" y="0"/>
+          <a:ext cx="0" cy="0"/>
+          <a:chOff x="0" y="0"/>
+          <a:chExt cx="0" cy="0"/>
+        </a:xfrm>
+      </p:grpSpPr>
+      <p:pic>
+        <p:nvPicPr>
+          <p:cNvPr id="15" name="图片 14">
+            <a:extLst>
+              <a:ext uri="{FF2B5EF4-FFF2-40B4-BE49-F238E27FC236}">
+                <a16:creationId xmlns:a16="http://schemas.microsoft.com/office/drawing/2014/main" id="{55749599-2468-4144-8AC4-0C0E6F31F0C6}"/>
+              </a:ext>
+            </a:extLst>
+          </p:cNvPr>
+          <p:cNvPicPr>
+            <a:picLocks noChangeAspect="1"/>
+          </p:cNvPicPr>
+          <p:nvPr/>
+        </p:nvPicPr>
+        <p:blipFill>
+          <a:blip r:embed="rId2"/>
+          <a:stretch>
+            <a:fillRect/>
+          </a:stretch>
+        </p:blipFill>
+        <p:spPr>
+          <a:xfrm>
+            <a:off x="5281420" y="51797"/>
+            <a:ext cx="6912205" cy="1490895"/>
+          </a:xfrm>
+          <a:prstGeom prst="rect">
+            <a:avLst/>
+          </a:prstGeom>
+        </p:spPr>
+      </p:pic>
+      <p:pic>
+        <p:nvPicPr>
+          <p:cNvPr id="20" name="图片 19">
+            <a:extLst>
+              <a:ext uri="{FF2B5EF4-FFF2-40B4-BE49-F238E27FC236}">
+                <a16:creationId xmlns:a16="http://schemas.microsoft.com/office/drawing/2014/main" id="{29DFF50B-8BDD-4062-B5BF-8BFD3977D56C}"/>
+              </a:ext>
+            </a:extLst>
+          </p:cNvPr>
+          <p:cNvPicPr>
+            <a:picLocks noChangeAspect="1"/>
+          </p:cNvPicPr>
+          <p:nvPr/>
+        </p:nvPicPr>
+        <p:blipFill>
+          <a:blip r:embed="rId3"/>
+          <a:stretch>
+            <a:fillRect/>
+          </a:stretch>
+        </p:blipFill>
+        <p:spPr>
+          <a:xfrm>
+            <a:off x="5281424" y="1542692"/>
+            <a:ext cx="6731439" cy="902557"/>
+          </a:xfrm>
+          <a:prstGeom prst="rect">
+            <a:avLst/>
+          </a:prstGeom>
+        </p:spPr>
+      </p:pic>
+      <p:pic>
+        <p:nvPicPr>
+          <p:cNvPr id="21" name="图片 20">
+            <a:extLst>
+              <a:ext uri="{FF2B5EF4-FFF2-40B4-BE49-F238E27FC236}">
+                <a16:creationId xmlns:a16="http://schemas.microsoft.com/office/drawing/2014/main" id="{70397D3E-FA84-41DC-A53B-D09B6764603E}"/>
+              </a:ext>
+            </a:extLst>
+          </p:cNvPr>
+          <p:cNvPicPr>
+            <a:picLocks noChangeAspect="1"/>
+          </p:cNvPicPr>
+          <p:nvPr/>
+        </p:nvPicPr>
+        <p:blipFill>
+          <a:blip r:embed="rId4"/>
+          <a:stretch>
+            <a:fillRect/>
+          </a:stretch>
+        </p:blipFill>
+        <p:spPr>
+          <a:xfrm>
+            <a:off x="5281420" y="2951849"/>
+            <a:ext cx="6731443" cy="1573570"/>
+          </a:xfrm>
+          <a:prstGeom prst="rect">
+            <a:avLst/>
+          </a:prstGeom>
+        </p:spPr>
+      </p:pic>
+      <p:pic>
+        <p:nvPicPr>
+          <p:cNvPr id="22" name="图片 21">
+            <a:extLst>
+              <a:ext uri="{FF2B5EF4-FFF2-40B4-BE49-F238E27FC236}">
+                <a16:creationId xmlns:a16="http://schemas.microsoft.com/office/drawing/2014/main" id="{4D5BB9F3-CEF1-4B92-B22C-A3DA3E1CEE51}"/>
+              </a:ext>
+            </a:extLst>
+          </p:cNvPr>
+          <p:cNvPicPr>
+            <a:picLocks noChangeAspect="1"/>
+          </p:cNvPicPr>
+          <p:nvPr/>
+        </p:nvPicPr>
+        <p:blipFill>
+          <a:blip r:embed="rId5"/>
+          <a:stretch>
+            <a:fillRect/>
+          </a:stretch>
+        </p:blipFill>
+        <p:spPr>
+          <a:xfrm>
+            <a:off x="5310986" y="4836333"/>
+            <a:ext cx="6636462" cy="1520401"/>
+          </a:xfrm>
+          <a:prstGeom prst="rect">
+            <a:avLst/>
+          </a:prstGeom>
+        </p:spPr>
+      </p:pic>
+      <p:pic>
+        <p:nvPicPr>
+          <p:cNvPr id="23" name="图片 22">
+            <a:extLst>
+              <a:ext uri="{FF2B5EF4-FFF2-40B4-BE49-F238E27FC236}">
+                <a16:creationId xmlns:a16="http://schemas.microsoft.com/office/drawing/2014/main" id="{2010A422-0143-49EE-95B0-A35C66A70325}"/>
+              </a:ext>
+            </a:extLst>
+          </p:cNvPr>
+          <p:cNvPicPr>
+            <a:picLocks noChangeAspect="1"/>
+          </p:cNvPicPr>
+          <p:nvPr/>
+        </p:nvPicPr>
+        <p:blipFill>
+          <a:blip r:embed="rId6"/>
+          <a:stretch>
+            <a:fillRect/>
+          </a:stretch>
+        </p:blipFill>
+        <p:spPr>
+          <a:xfrm>
+            <a:off x="8057586" y="3647625"/>
+            <a:ext cx="1405187" cy="704254"/>
+          </a:xfrm>
+          <a:prstGeom prst="rect">
+            <a:avLst/>
+          </a:prstGeom>
+        </p:spPr>
+      </p:pic>
+      <p:pic>
+        <p:nvPicPr>
+          <p:cNvPr id="24" name="图片 23">
+            <a:extLst>
+              <a:ext uri="{FF2B5EF4-FFF2-40B4-BE49-F238E27FC236}">
+                <a16:creationId xmlns:a16="http://schemas.microsoft.com/office/drawing/2014/main" id="{3CC3551D-8E6F-4AEA-BAC4-1082C0996B16}"/>
+              </a:ext>
+            </a:extLst>
+          </p:cNvPr>
+          <p:cNvPicPr>
+            <a:picLocks noChangeAspect="1"/>
+          </p:cNvPicPr>
+          <p:nvPr/>
+        </p:nvPicPr>
+        <p:blipFill>
+          <a:blip r:embed="rId7"/>
+          <a:stretch>
+            <a:fillRect/>
+          </a:stretch>
+        </p:blipFill>
+        <p:spPr>
+          <a:xfrm>
+            <a:off x="10185049" y="3647625"/>
+            <a:ext cx="878539" cy="704254"/>
+          </a:xfrm>
+          <a:prstGeom prst="rect">
+            <a:avLst/>
+          </a:prstGeom>
+        </p:spPr>
+      </p:pic>
+      <p:pic>
+        <p:nvPicPr>
+          <p:cNvPr id="25" name="图片 24">
+            <a:extLst>
+              <a:ext uri="{FF2B5EF4-FFF2-40B4-BE49-F238E27FC236}">
+                <a16:creationId xmlns:a16="http://schemas.microsoft.com/office/drawing/2014/main" id="{3AC61908-060A-499F-8CF4-5B26A053240C}"/>
+              </a:ext>
+            </a:extLst>
+          </p:cNvPr>
+          <p:cNvPicPr>
+            <a:picLocks noChangeAspect="1"/>
+          </p:cNvPicPr>
+          <p:nvPr/>
+        </p:nvPicPr>
+        <p:blipFill>
+          <a:blip r:embed="rId8"/>
+          <a:stretch>
+            <a:fillRect/>
+          </a:stretch>
+        </p:blipFill>
+        <p:spPr>
+          <a:xfrm>
+            <a:off x="7655116" y="5590944"/>
+            <a:ext cx="4197285" cy="512925"/>
+          </a:xfrm>
+          <a:prstGeom prst="rect">
+            <a:avLst/>
+          </a:prstGeom>
+        </p:spPr>
+      </p:pic>
+      <p:pic>
+        <p:nvPicPr>
+          <p:cNvPr id="26" name="图片 25">
+            <a:extLst>
+              <a:ext uri="{FF2B5EF4-FFF2-40B4-BE49-F238E27FC236}">
+                <a16:creationId xmlns:a16="http://schemas.microsoft.com/office/drawing/2014/main" id="{68DB7FF4-55C2-4597-A951-2179E2D8403C}"/>
+              </a:ext>
+            </a:extLst>
+          </p:cNvPr>
+          <p:cNvPicPr>
+            <a:picLocks noChangeAspect="1"/>
+          </p:cNvPicPr>
+          <p:nvPr/>
+        </p:nvPicPr>
+        <p:blipFill>
+          <a:blip r:embed="rId9"/>
+          <a:stretch>
+            <a:fillRect/>
+          </a:stretch>
+        </p:blipFill>
+        <p:spPr>
+          <a:xfrm>
+            <a:off x="7881939" y="1927104"/>
+            <a:ext cx="1445838" cy="353805"/>
+          </a:xfrm>
+          <a:prstGeom prst="rect">
+            <a:avLst/>
+          </a:prstGeom>
+        </p:spPr>
+      </p:pic>
+      <p:pic>
+        <p:nvPicPr>
+          <p:cNvPr id="27" name="图片 26">
+            <a:extLst>
+              <a:ext uri="{FF2B5EF4-FFF2-40B4-BE49-F238E27FC236}">
+                <a16:creationId xmlns:a16="http://schemas.microsoft.com/office/drawing/2014/main" id="{A950FEBE-688A-41E2-B2EE-C0E59058A7C0}"/>
+              </a:ext>
+            </a:extLst>
+          </p:cNvPr>
+          <p:cNvPicPr>
+            <a:picLocks noChangeAspect="1"/>
+          </p:cNvPicPr>
+          <p:nvPr/>
+        </p:nvPicPr>
+        <p:blipFill>
+          <a:blip r:embed="rId10"/>
+          <a:stretch>
+            <a:fillRect/>
+          </a:stretch>
+        </p:blipFill>
+        <p:spPr>
+          <a:xfrm>
+            <a:off x="9753759" y="1927104"/>
+            <a:ext cx="647347" cy="353805"/>
+          </a:xfrm>
+          <a:prstGeom prst="rect">
+            <a:avLst/>
+          </a:prstGeom>
+        </p:spPr>
+      </p:pic>
+      <p:cxnSp>
+        <p:nvCxnSpPr>
+          <p:cNvPr id="28" name="直接连接符 27">
+            <a:extLst>
+              <a:ext uri="{FF2B5EF4-FFF2-40B4-BE49-F238E27FC236}">
+                <a16:creationId xmlns:a16="http://schemas.microsoft.com/office/drawing/2014/main" id="{AD217233-19C4-4F55-9FB7-946365F54A4F}"/>
+              </a:ext>
+            </a:extLst>
+          </p:cNvPr>
+          <p:cNvCxnSpPr>
+            <a:cxnSpLocks/>
+          </p:cNvCxnSpPr>
+          <p:nvPr/>
+        </p:nvCxnSpPr>
+        <p:spPr>
+          <a:xfrm>
+            <a:off x="5173804" y="50026"/>
+            <a:ext cx="0" cy="6720475"/>
+          </a:xfrm>
+          <a:prstGeom prst="line">
+            <a:avLst/>
+          </a:prstGeom>
+          <a:ln w="15875">
+            <a:solidFill>
+              <a:schemeClr val="tx1"/>
+            </a:solidFill>
+          </a:ln>
+        </p:spPr>
+        <p:style>
+          <a:lnRef idx="1">
+            <a:schemeClr val="dk1"/>
+          </a:lnRef>
+          <a:fillRef idx="0">
+            <a:schemeClr val="dk1"/>
+          </a:fillRef>
+          <a:effectRef idx="0">
+            <a:schemeClr val="dk1"/>
+          </a:effectRef>
+          <a:fontRef idx="minor">
+            <a:schemeClr val="tx1"/>
+          </a:fontRef>
+        </p:style>
+      </p:cxnSp>
+      <p:sp>
+        <p:nvSpPr>
+          <p:cNvPr id="5" name="椭圆 4">
+            <a:extLst>
+              <a:ext uri="{FF2B5EF4-FFF2-40B4-BE49-F238E27FC236}">
+                <a16:creationId xmlns:a16="http://schemas.microsoft.com/office/drawing/2014/main" id="{A31F3410-4C83-49FD-B9C2-E81C8CDB7197}"/>
+              </a:ext>
+            </a:extLst>
+          </p:cNvPr>
+          <p:cNvSpPr/>
+          <p:nvPr/>
+        </p:nvSpPr>
+        <p:spPr>
+          <a:xfrm>
+            <a:off x="5253306" y="256854"/>
+            <a:ext cx="2883828" cy="902556"/>
+          </a:xfrm>
+          <a:prstGeom prst="ellipse">
+            <a:avLst/>
+          </a:prstGeom>
+          <a:noFill/>
+          <a:ln w="12700">
+            <a:solidFill>
+              <a:srgbClr val="FF0000"/>
+            </a:solidFill>
+            <a:prstDash val="lgDash"/>
+          </a:ln>
+        </p:spPr>
+        <p:style>
+          <a:lnRef idx="2">
+            <a:schemeClr val="accent6"/>
+          </a:lnRef>
+          <a:fillRef idx="1">
+            <a:schemeClr val="lt1"/>
+          </a:fillRef>
+          <a:effectRef idx="0">
+            <a:schemeClr val="accent6"/>
+          </a:effectRef>
+          <a:fontRef idx="minor">
+            <a:schemeClr val="dk1"/>
+          </a:fontRef>
+        </p:style>
+        <p:txBody>
+          <a:bodyPr rtlCol="0" anchor="ctr"/>
+          <a:lstStyle/>
+          <a:p>
+            <a:pPr algn="ctr"/>
+            <a:endParaRPr lang="zh-CN" altLang="en-US"/>
+          </a:p>
+        </p:txBody>
+      </p:sp>
+      <p:pic>
+        <p:nvPicPr>
+          <p:cNvPr id="16" name="图片 15">
+            <a:extLst>
+              <a:ext uri="{FF2B5EF4-FFF2-40B4-BE49-F238E27FC236}">
+                <a16:creationId xmlns:a16="http://schemas.microsoft.com/office/drawing/2014/main" id="{0D55739B-EF77-4E02-B8E7-6A623738891E}"/>
+              </a:ext>
+            </a:extLst>
+          </p:cNvPr>
+          <p:cNvPicPr>
+            <a:picLocks noChangeAspect="1"/>
+          </p:cNvPicPr>
+          <p:nvPr/>
+        </p:nvPicPr>
+        <p:blipFill>
+          <a:blip r:embed="rId11"/>
+          <a:stretch>
+            <a:fillRect/>
+          </a:stretch>
+        </p:blipFill>
+        <p:spPr>
+          <a:xfrm>
+            <a:off x="449322" y="2221009"/>
+            <a:ext cx="4465835" cy="3661150"/>
+          </a:xfrm>
+          <a:prstGeom prst="rect">
+            <a:avLst/>
+          </a:prstGeom>
+        </p:spPr>
+      </p:pic>
+      <p:sp>
+        <p:nvSpPr>
+          <p:cNvPr id="17" name="文本框 16">
+            <a:extLst>
+              <a:ext uri="{FF2B5EF4-FFF2-40B4-BE49-F238E27FC236}">
+                <a16:creationId xmlns:a16="http://schemas.microsoft.com/office/drawing/2014/main" id="{D7048DE6-5BDD-4B67-8C4E-E8D601B44886}"/>
+              </a:ext>
+            </a:extLst>
+          </p:cNvPr>
+          <p:cNvSpPr txBox="1"/>
+          <p:nvPr/>
+        </p:nvSpPr>
+        <p:spPr>
+          <a:xfrm>
+            <a:off x="162560" y="87499"/>
+            <a:ext cx="5039360" cy="923330"/>
+          </a:xfrm>
+          <a:prstGeom prst="rect">
+            <a:avLst/>
+          </a:prstGeom>
+          <a:solidFill>
+            <a:schemeClr val="tx2">
+              <a:lumMod val="20000"/>
+              <a:lumOff val="80000"/>
+            </a:schemeClr>
+          </a:solidFill>
+        </p:spPr>
+        <p:txBody>
+          <a:bodyPr wrap="square" rtlCol="0">
+            <a:spAutoFit/>
+          </a:bodyPr>
+          <a:lstStyle/>
+          <a:p>
+            <a:r>
+              <a:rPr lang="en-US" altLang="zh-CN" b="1" dirty="0" err="1">
+                <a:latin typeface="微软雅黑" panose="020B0503020204020204" pitchFamily="34" charset="-122"/>
+                <a:ea typeface="微软雅黑" panose="020B0503020204020204" pitchFamily="34" charset="-122"/>
+              </a:rPr>
+              <a:t>ConSERT</a:t>
+            </a:r>
+            <a:r>
+              <a:rPr lang="en-US" altLang="zh-CN" dirty="0">
+                <a:latin typeface="微软雅黑" panose="020B0503020204020204" pitchFamily="34" charset="-122"/>
+                <a:ea typeface="微软雅黑" panose="020B0503020204020204" pitchFamily="34" charset="-122"/>
+              </a:rPr>
+              <a:t>: A Contrastive Framework for Self-Supervised Sentence Representation Transfer</a:t>
+            </a:r>
+            <a:endParaRPr lang="zh-CN" altLang="en-US" dirty="0">
+              <a:latin typeface="微软雅黑" panose="020B0503020204020204" pitchFamily="34" charset="-122"/>
+              <a:ea typeface="微软雅黑" panose="020B0503020204020204" pitchFamily="34" charset="-122"/>
+            </a:endParaRPr>
+          </a:p>
+        </p:txBody>
+      </p:sp>
+      <p:sp>
+        <p:nvSpPr>
+          <p:cNvPr id="18" name="矩形: 圆角 17">
+            <a:extLst>
+              <a:ext uri="{FF2B5EF4-FFF2-40B4-BE49-F238E27FC236}">
+                <a16:creationId xmlns:a16="http://schemas.microsoft.com/office/drawing/2014/main" id="{C20C3939-357E-48AD-8CEB-8DAF9DDE54FB}"/>
+              </a:ext>
+            </a:extLst>
+          </p:cNvPr>
+          <p:cNvSpPr/>
+          <p:nvPr/>
+        </p:nvSpPr>
+        <p:spPr>
+          <a:xfrm>
+            <a:off x="701040" y="1493520"/>
+            <a:ext cx="1595120" cy="589280"/>
+          </a:xfrm>
+          <a:prstGeom prst="roundRect">
+            <a:avLst/>
+          </a:prstGeom>
+          <a:solidFill>
+            <a:schemeClr val="bg1">
+              <a:lumMod val="95000"/>
+            </a:schemeClr>
+          </a:solidFill>
+        </p:spPr>
+        <p:style>
+          <a:lnRef idx="2">
+            <a:schemeClr val="accent1">
+              <a:shade val="50000"/>
+            </a:schemeClr>
+          </a:lnRef>
+          <a:fillRef idx="1">
+            <a:schemeClr val="accent1"/>
+          </a:fillRef>
+          <a:effectRef idx="0">
+            <a:schemeClr val="accent1"/>
+          </a:effectRef>
+          <a:fontRef idx="minor">
+            <a:schemeClr val="lt1"/>
+          </a:fontRef>
+        </p:style>
+        <p:txBody>
+          <a:bodyPr rot="0" spcFirstLastPara="0" vertOverflow="overflow" horzOverflow="overflow" vert="horz" wrap="square" lIns="91440" tIns="45720" rIns="91440" bIns="45720" numCol="1" spcCol="0" rtlCol="0" fromWordArt="0" anchor="ctr" anchorCtr="0" forceAA="0" compatLnSpc="1">
+            <a:prstTxWarp prst="textNoShape">
+              <a:avLst/>
+            </a:prstTxWarp>
+            <a:noAutofit/>
+          </a:bodyPr>
+          <a:lstStyle/>
+          <a:p>
+            <a:pPr algn="ctr"/>
+            <a:r>
+              <a:rPr lang="en-US" altLang="zh-CN" dirty="0">
+                <a:ln w="0"/>
+                <a:solidFill>
+                  <a:schemeClr val="tx1"/>
+                </a:solidFill>
+                <a:effectLst>
+                  <a:outerShdw blurRad="38100" dist="19050" dir="2700000" algn="tl" rotWithShape="0">
+                    <a:schemeClr val="dk1">
+                      <a:alpha val="40000"/>
+                    </a:schemeClr>
+                  </a:outerShdw>
+                </a:effectLst>
+              </a:rPr>
+              <a:t>shuffle</a:t>
+            </a:r>
+            <a:endParaRPr lang="zh-CN" altLang="en-US" dirty="0">
+              <a:ln w="0"/>
+              <a:solidFill>
+                <a:schemeClr val="tx1"/>
+              </a:solidFill>
+              <a:effectLst>
+                <a:outerShdw blurRad="38100" dist="19050" dir="2700000" algn="tl" rotWithShape="0">
+                  <a:schemeClr val="dk1">
+                    <a:alpha val="40000"/>
+                  </a:schemeClr>
+                </a:outerShdw>
+              </a:effectLst>
+            </a:endParaRPr>
+          </a:p>
+        </p:txBody>
+      </p:sp>
+      <p:sp>
+        <p:nvSpPr>
+          <p:cNvPr id="19" name="加号 18">
+            <a:extLst>
+              <a:ext uri="{FF2B5EF4-FFF2-40B4-BE49-F238E27FC236}">
+                <a16:creationId xmlns:a16="http://schemas.microsoft.com/office/drawing/2014/main" id="{73022680-034B-410E-AE4B-6BB21448822C}"/>
+              </a:ext>
+            </a:extLst>
+          </p:cNvPr>
+          <p:cNvSpPr/>
+          <p:nvPr/>
+        </p:nvSpPr>
+        <p:spPr>
+          <a:xfrm>
+            <a:off x="2296160" y="1493520"/>
+            <a:ext cx="680720" cy="589280"/>
+          </a:xfrm>
+          <a:prstGeom prst="mathPlus">
+            <a:avLst/>
+          </a:prstGeom>
+          <a:solidFill>
+            <a:schemeClr val="tx1">
+              <a:lumMod val="65000"/>
+              <a:lumOff val="35000"/>
+            </a:schemeClr>
+          </a:solidFill>
+        </p:spPr>
+        <p:style>
+          <a:lnRef idx="2">
+            <a:schemeClr val="accent1">
+              <a:shade val="50000"/>
+            </a:schemeClr>
+          </a:lnRef>
+          <a:fillRef idx="1">
+            <a:schemeClr val="accent1"/>
+          </a:fillRef>
+          <a:effectRef idx="0">
+            <a:schemeClr val="accent1"/>
+          </a:effectRef>
+          <a:fontRef idx="minor">
+            <a:schemeClr val="lt1"/>
+          </a:fontRef>
+        </p:style>
+        <p:txBody>
+          <a:bodyPr rtlCol="0" anchor="ctr"/>
+          <a:lstStyle/>
+          <a:p>
+            <a:pPr algn="ctr"/>
+            <a:endParaRPr lang="zh-CN" altLang="en-US"/>
+          </a:p>
+        </p:txBody>
+      </p:sp>
+      <p:sp>
+        <p:nvSpPr>
+          <p:cNvPr id="29" name="矩形: 圆角 28">
+            <a:extLst>
+              <a:ext uri="{FF2B5EF4-FFF2-40B4-BE49-F238E27FC236}">
+                <a16:creationId xmlns:a16="http://schemas.microsoft.com/office/drawing/2014/main" id="{E8402E05-C8D5-4AC5-AEC8-AF9FD3D6C9D1}"/>
+              </a:ext>
+            </a:extLst>
+          </p:cNvPr>
+          <p:cNvSpPr/>
+          <p:nvPr/>
+        </p:nvSpPr>
+        <p:spPr>
+          <a:xfrm>
+            <a:off x="2976880" y="1493520"/>
+            <a:ext cx="1595120" cy="589280"/>
+          </a:xfrm>
+          <a:prstGeom prst="roundRect">
+            <a:avLst/>
+          </a:prstGeom>
+          <a:solidFill>
+            <a:schemeClr val="bg1">
+              <a:lumMod val="95000"/>
+            </a:schemeClr>
+          </a:solidFill>
+        </p:spPr>
+        <p:style>
+          <a:lnRef idx="2">
+            <a:schemeClr val="accent1">
+              <a:shade val="50000"/>
+            </a:schemeClr>
+          </a:lnRef>
+          <a:fillRef idx="1">
+            <a:schemeClr val="accent1"/>
+          </a:fillRef>
+          <a:effectRef idx="0">
+            <a:schemeClr val="accent1"/>
+          </a:effectRef>
+          <a:fontRef idx="minor">
+            <a:schemeClr val="lt1"/>
+          </a:fontRef>
+        </p:style>
+        <p:txBody>
+          <a:bodyPr rot="0" spcFirstLastPara="0" vertOverflow="overflow" horzOverflow="overflow" vert="horz" wrap="square" lIns="91440" tIns="45720" rIns="91440" bIns="45720" numCol="1" spcCol="0" rtlCol="0" fromWordArt="0" anchor="ctr" anchorCtr="0" forceAA="0" compatLnSpc="1">
+            <a:prstTxWarp prst="textNoShape">
+              <a:avLst/>
+            </a:prstTxWarp>
+            <a:noAutofit/>
+          </a:bodyPr>
+          <a:lstStyle/>
+          <a:p>
+            <a:pPr algn="ctr"/>
+            <a:r>
+              <a:rPr lang="en-US" altLang="zh-CN" dirty="0">
+                <a:ln w="0"/>
+                <a:solidFill>
+                  <a:schemeClr val="tx1"/>
+                </a:solidFill>
+                <a:effectLst>
+                  <a:outerShdw blurRad="38100" dist="19050" dir="2700000" algn="tl" rotWithShape="0">
+                    <a:schemeClr val="dk1">
+                      <a:alpha val="40000"/>
+                    </a:schemeClr>
+                  </a:outerShdw>
+                </a:effectLst>
+              </a:rPr>
+              <a:t>cutoff</a:t>
+            </a:r>
+            <a:endParaRPr lang="zh-CN" altLang="en-US" dirty="0">
+              <a:ln w="0"/>
+              <a:solidFill>
+                <a:schemeClr val="tx1"/>
+              </a:solidFill>
+              <a:effectLst>
+                <a:outerShdw blurRad="38100" dist="19050" dir="2700000" algn="tl" rotWithShape="0">
+                  <a:schemeClr val="dk1">
+                    <a:alpha val="40000"/>
+                  </a:schemeClr>
+                </a:outerShdw>
+              </a:effectLst>
+            </a:endParaRPr>
+          </a:p>
+        </p:txBody>
+      </p:sp>
+      <p:sp>
+        <p:nvSpPr>
+          <p:cNvPr id="2" name="矩形 1">
+            <a:extLst>
+              <a:ext uri="{FF2B5EF4-FFF2-40B4-BE49-F238E27FC236}">
+                <a16:creationId xmlns:a16="http://schemas.microsoft.com/office/drawing/2014/main" id="{600B1221-99B0-418B-B4A6-59F250D28032}"/>
+              </a:ext>
+            </a:extLst>
+          </p:cNvPr>
+          <p:cNvSpPr/>
+          <p:nvPr/>
+        </p:nvSpPr>
+        <p:spPr>
+          <a:xfrm>
+            <a:off x="3048000" y="3105835"/>
+            <a:ext cx="6096000" cy="646331"/>
+          </a:xfrm>
+          <a:prstGeom prst="rect">
+            <a:avLst/>
+          </a:prstGeom>
+        </p:spPr>
+        <p:txBody>
+          <a:bodyPr>
+            <a:spAutoFit/>
+          </a:bodyPr>
+          <a:lstStyle/>
+          <a:p>
+            <a:r>
+              <a:rPr lang="zh-CN" altLang="en-US" dirty="0"/>
+              <a:t>sentences1_list=[sen[0] for sen in test_sentences]</a:t>
+            </a:r>
+          </a:p>
+          <a:p>
+            <a:r>
+              <a:rPr lang="zh-CN" altLang="en-US" dirty="0"/>
+              <a:t>sentences2_list=[sen[1] for sen in test_sentences]</a:t>
+            </a:r>
+          </a:p>
+        </p:txBody>
+      </p:sp>
+    </p:spTree>
+    <p:extLst>
+      <p:ext uri="{BB962C8B-B14F-4D97-AF65-F5344CB8AC3E}">
+        <p14:creationId xmlns:p14="http://schemas.microsoft.com/office/powerpoint/2010/main" val="3925136739"/>
+      </p:ext>
+    </p:extLst>
+  </p:cSld>
+  <p:clrMapOvr>
+    <a:masterClrMapping/>
+  </p:clrMapOvr>
+</p:sld>
+</file>
+
+<file path=ppt/slides/slide9.xml><?xml version="1.0" encoding="utf-8"?>
+<p:sld xmlns:a="http://schemas.openxmlformats.org/drawingml/2006/main" xmlns:r="http://schemas.openxmlformats.org/officeDocument/2006/relationships" xmlns:p="http://schemas.openxmlformats.org/presentationml/2006/main">
+  <p:cSld>
+    <p:spTree>
+      <p:nvGrpSpPr>
+        <p:cNvPr id="1" name=""/>
+        <p:cNvGrpSpPr/>
+        <p:nvPr/>
+      </p:nvGrpSpPr>
+      <p:grpSpPr>
+        <a:xfrm>
+          <a:off x="0" y="0"/>
+          <a:ext cx="0" cy="0"/>
+          <a:chOff x="0" y="0"/>
+          <a:chExt cx="0" cy="0"/>
+        </a:xfrm>
+      </p:grpSpPr>
+      <p:sp>
+        <p:nvSpPr>
+          <p:cNvPr id="4" name="文本框 3">
+            <a:extLst>
+              <a:ext uri="{FF2B5EF4-FFF2-40B4-BE49-F238E27FC236}">
+                <a16:creationId xmlns:a16="http://schemas.microsoft.com/office/drawing/2014/main" id="{B285EA4A-9E0F-4C5B-A9D8-68F3D328BE2C}"/>
+              </a:ext>
+            </a:extLst>
+          </p:cNvPr>
+          <p:cNvSpPr txBox="1"/>
+          <p:nvPr/>
+        </p:nvSpPr>
+        <p:spPr>
+          <a:xfrm>
+            <a:off x="680720" y="322235"/>
+            <a:ext cx="10566400" cy="707886"/>
+          </a:xfrm>
+          <a:prstGeom prst="rect">
+            <a:avLst/>
+          </a:prstGeom>
+          <a:noFill/>
+        </p:spPr>
+        <p:txBody>
+          <a:bodyPr wrap="square" rtlCol="0">
+            <a:spAutoFit/>
+          </a:bodyPr>
+          <a:lstStyle/>
+          <a:p>
+            <a:r>
+              <a:rPr lang="en-US" altLang="zh-CN" sz="2000" b="1" dirty="0">
+                <a:latin typeface="微软雅黑" panose="020B0503020204020204" pitchFamily="34" charset="-122"/>
+                <a:ea typeface="微软雅黑" panose="020B0503020204020204" pitchFamily="34" charset="-122"/>
+              </a:rPr>
+              <a:t>Understanding Contrastive Representation Learning through </a:t>
+            </a:r>
+            <a:r>
+              <a:rPr lang="en-US" altLang="zh-CN" sz="2000" b="1" dirty="0">
+                <a:solidFill>
+                  <a:srgbClr val="FF0000"/>
+                </a:solidFill>
+                <a:latin typeface="微软雅黑" panose="020B0503020204020204" pitchFamily="34" charset="-122"/>
+                <a:ea typeface="微软雅黑" panose="020B0503020204020204" pitchFamily="34" charset="-122"/>
+              </a:rPr>
+              <a:t>Alignment</a:t>
+            </a:r>
+            <a:r>
+              <a:rPr lang="en-US" altLang="zh-CN" sz="2000" b="1" dirty="0">
+                <a:latin typeface="微软雅黑" panose="020B0503020204020204" pitchFamily="34" charset="-122"/>
+                <a:ea typeface="微软雅黑" panose="020B0503020204020204" pitchFamily="34" charset="-122"/>
+              </a:rPr>
+              <a:t> and </a:t>
+            </a:r>
+            <a:r>
+              <a:rPr lang="en-US" altLang="zh-CN" sz="2000" b="1" dirty="0">
+                <a:solidFill>
+                  <a:srgbClr val="FF0000"/>
+                </a:solidFill>
+                <a:latin typeface="微软雅黑" panose="020B0503020204020204" pitchFamily="34" charset="-122"/>
+                <a:ea typeface="微软雅黑" panose="020B0503020204020204" pitchFamily="34" charset="-122"/>
+              </a:rPr>
+              <a:t>Uniformity</a:t>
+            </a:r>
+            <a:r>
+              <a:rPr lang="en-US" altLang="zh-CN" sz="2000" b="1" dirty="0">
+                <a:latin typeface="微软雅黑" panose="020B0503020204020204" pitchFamily="34" charset="-122"/>
+                <a:ea typeface="微软雅黑" panose="020B0503020204020204" pitchFamily="34" charset="-122"/>
+              </a:rPr>
+              <a:t> on the Hypersphere    ICML2020</a:t>
+            </a:r>
+            <a:endParaRPr lang="zh-CN" altLang="en-US" sz="2000" b="1" dirty="0">
+              <a:latin typeface="微软雅黑" panose="020B0503020204020204" pitchFamily="34" charset="-122"/>
+              <a:ea typeface="微软雅黑" panose="020B0503020204020204" pitchFamily="34" charset="-122"/>
+            </a:endParaRPr>
+          </a:p>
+        </p:txBody>
+      </p:sp>
+      <p:pic>
+        <p:nvPicPr>
+          <p:cNvPr id="5" name="图片 4">
+            <a:extLst>
+              <a:ext uri="{FF2B5EF4-FFF2-40B4-BE49-F238E27FC236}">
+                <a16:creationId xmlns:a16="http://schemas.microsoft.com/office/drawing/2014/main" id="{5BF870F2-2557-40EC-B5C5-86CB72D1EC2D}"/>
+              </a:ext>
+            </a:extLst>
+          </p:cNvPr>
+          <p:cNvPicPr>
+            <a:picLocks noChangeAspect="1"/>
+          </p:cNvPicPr>
+          <p:nvPr/>
+        </p:nvPicPr>
+        <p:blipFill>
+          <a:blip r:embed="rId2"/>
+          <a:stretch>
+            <a:fillRect/>
+          </a:stretch>
+        </p:blipFill>
+        <p:spPr>
+          <a:xfrm>
+            <a:off x="995680" y="1624517"/>
+            <a:ext cx="4140100" cy="2892811"/>
+          </a:xfrm>
+          <a:prstGeom prst="rect">
+            <a:avLst/>
+          </a:prstGeom>
+        </p:spPr>
+      </p:pic>
+      <p:pic>
+        <p:nvPicPr>
+          <p:cNvPr id="6" name="图片 5">
+            <a:extLst>
+              <a:ext uri="{FF2B5EF4-FFF2-40B4-BE49-F238E27FC236}">
+                <a16:creationId xmlns:a16="http://schemas.microsoft.com/office/drawing/2014/main" id="{19062F37-B8CA-4FAE-BDA6-06414C5549D2}"/>
+              </a:ext>
+            </a:extLst>
+          </p:cNvPr>
+          <p:cNvPicPr>
+            <a:picLocks noChangeAspect="1"/>
+          </p:cNvPicPr>
+          <p:nvPr/>
+        </p:nvPicPr>
+        <p:blipFill>
+          <a:blip r:embed="rId3"/>
+          <a:stretch>
+            <a:fillRect/>
+          </a:stretch>
+        </p:blipFill>
+        <p:spPr>
+          <a:xfrm>
+            <a:off x="6299200" y="1675891"/>
+            <a:ext cx="3698240" cy="2841438"/>
+          </a:xfrm>
+          <a:prstGeom prst="rect">
+            <a:avLst/>
+          </a:prstGeom>
+        </p:spPr>
+      </p:pic>
+      <p:pic>
+        <p:nvPicPr>
+          <p:cNvPr id="7" name="图片 6">
+            <a:extLst>
+              <a:ext uri="{FF2B5EF4-FFF2-40B4-BE49-F238E27FC236}">
+                <a16:creationId xmlns:a16="http://schemas.microsoft.com/office/drawing/2014/main" id="{847DBC50-639D-4393-91C8-5018FBDDCB9E}"/>
+              </a:ext>
+            </a:extLst>
+          </p:cNvPr>
+          <p:cNvPicPr>
+            <a:picLocks noChangeAspect="1"/>
+          </p:cNvPicPr>
+          <p:nvPr/>
+        </p:nvPicPr>
+        <p:blipFill>
+          <a:blip r:embed="rId4"/>
+          <a:stretch>
+            <a:fillRect/>
+          </a:stretch>
+        </p:blipFill>
+        <p:spPr>
+          <a:xfrm>
+            <a:off x="1447800" y="4847555"/>
+            <a:ext cx="3200503" cy="528337"/>
+          </a:xfrm>
+          <a:prstGeom prst="rect">
+            <a:avLst/>
+          </a:prstGeom>
+        </p:spPr>
+      </p:pic>
+      <p:sp>
+        <p:nvSpPr>
+          <p:cNvPr id="8" name="文本框 7">
+            <a:extLst>
+              <a:ext uri="{FF2B5EF4-FFF2-40B4-BE49-F238E27FC236}">
+                <a16:creationId xmlns:a16="http://schemas.microsoft.com/office/drawing/2014/main" id="{F9837136-7B5A-4A61-987E-E1899E0E7855}"/>
+              </a:ext>
+            </a:extLst>
+          </p:cNvPr>
+          <p:cNvSpPr txBox="1"/>
+          <p:nvPr/>
+        </p:nvSpPr>
+        <p:spPr>
+          <a:xfrm>
+            <a:off x="1316214" y="5562039"/>
+            <a:ext cx="3672345" cy="369332"/>
+          </a:xfrm>
+          <a:prstGeom prst="rect">
+            <a:avLst/>
+          </a:prstGeom>
+          <a:noFill/>
+        </p:spPr>
+        <p:txBody>
+          <a:bodyPr wrap="square" rtlCol="0">
+            <a:spAutoFit/>
+          </a:bodyPr>
+          <a:lstStyle/>
+          <a:p>
+            <a:r>
+              <a:rPr lang="en-US" altLang="zh-CN" dirty="0">
+                <a:latin typeface="微软雅黑" panose="020B0503020204020204" pitchFamily="34" charset="-122"/>
+                <a:ea typeface="微软雅黑" panose="020B0503020204020204" pitchFamily="34" charset="-122"/>
+              </a:rPr>
+              <a:t>Alignment: </a:t>
+            </a:r>
+            <a:r>
+              <a:rPr lang="zh-CN" altLang="en-US" dirty="0">
+                <a:latin typeface="微软雅黑" panose="020B0503020204020204" pitchFamily="34" charset="-122"/>
+                <a:ea typeface="微软雅黑" panose="020B0503020204020204" pitchFamily="34" charset="-122"/>
+              </a:rPr>
+              <a:t>衡量正例之间的距离</a:t>
+            </a:r>
+          </a:p>
+        </p:txBody>
+      </p:sp>
+      <p:pic>
+        <p:nvPicPr>
+          <p:cNvPr id="9" name="图片 8">
+            <a:extLst>
+              <a:ext uri="{FF2B5EF4-FFF2-40B4-BE49-F238E27FC236}">
+                <a16:creationId xmlns:a16="http://schemas.microsoft.com/office/drawing/2014/main" id="{8946BD30-BA97-40F3-94EA-69F7F35407B8}"/>
+              </a:ext>
+            </a:extLst>
+          </p:cNvPr>
+          <p:cNvPicPr>
+            <a:picLocks noChangeAspect="1"/>
+          </p:cNvPicPr>
+          <p:nvPr/>
+        </p:nvPicPr>
+        <p:blipFill>
+          <a:blip r:embed="rId5"/>
+          <a:stretch>
+            <a:fillRect/>
+          </a:stretch>
+        </p:blipFill>
+        <p:spPr>
+          <a:xfrm>
+            <a:off x="6553199" y="4753675"/>
+            <a:ext cx="3063343" cy="669865"/>
+          </a:xfrm>
+          <a:prstGeom prst="rect">
+            <a:avLst/>
+          </a:prstGeom>
+        </p:spPr>
+      </p:pic>
+      <p:sp>
+        <p:nvSpPr>
+          <p:cNvPr id="10" name="文本框 9">
+            <a:extLst>
+              <a:ext uri="{FF2B5EF4-FFF2-40B4-BE49-F238E27FC236}">
+                <a16:creationId xmlns:a16="http://schemas.microsoft.com/office/drawing/2014/main" id="{1ACEE4EA-2DEA-4A2D-B391-930464E64E13}"/>
+              </a:ext>
+            </a:extLst>
+          </p:cNvPr>
+          <p:cNvSpPr txBox="1"/>
+          <p:nvPr/>
+        </p:nvSpPr>
+        <p:spPr>
+          <a:xfrm>
+            <a:off x="6385559" y="5423540"/>
+            <a:ext cx="3816069" cy="646331"/>
+          </a:xfrm>
+          <a:prstGeom prst="rect">
+            <a:avLst/>
+          </a:prstGeom>
+          <a:noFill/>
+        </p:spPr>
+        <p:txBody>
+          <a:bodyPr wrap="square" rtlCol="0">
+            <a:spAutoFit/>
+          </a:bodyPr>
+          <a:lstStyle/>
+          <a:p>
+            <a:r>
+              <a:rPr lang="en-US" altLang="zh-CN" dirty="0">
+                <a:latin typeface="微软雅黑" panose="020B0503020204020204" pitchFamily="34" charset="-122"/>
+                <a:ea typeface="微软雅黑" panose="020B0503020204020204" pitchFamily="34" charset="-122"/>
+              </a:rPr>
+              <a:t>Uniformity: </a:t>
+            </a:r>
+            <a:r>
+              <a:rPr lang="zh-CN" altLang="en-US" dirty="0">
+                <a:latin typeface="微软雅黑" panose="020B0503020204020204" pitchFamily="34" charset="-122"/>
+                <a:ea typeface="微软雅黑" panose="020B0503020204020204" pitchFamily="34" charset="-122"/>
+              </a:rPr>
+              <a:t>衡量整体分布的均匀性</a:t>
+            </a:r>
+            <a:endParaRPr lang="en-US" altLang="zh-CN" dirty="0">
+              <a:latin typeface="微软雅黑" panose="020B0503020204020204" pitchFamily="34" charset="-122"/>
+              <a:ea typeface="微软雅黑" panose="020B0503020204020204" pitchFamily="34" charset="-122"/>
+            </a:endParaRPr>
+          </a:p>
+          <a:p>
+            <a:r>
+              <a:rPr lang="zh-CN" altLang="en-US" dirty="0">
+                <a:latin typeface="微软雅黑" panose="020B0503020204020204" pitchFamily="34" charset="-122"/>
+                <a:ea typeface="微软雅黑" panose="020B0503020204020204" pitchFamily="34" charset="-122"/>
+              </a:rPr>
+              <a:t>（</a:t>
+            </a:r>
+            <a:r>
+              <a:rPr lang="zh-CN" altLang="en-US" b="1" dirty="0">
+                <a:latin typeface="微软雅黑" panose="020B0503020204020204" pitchFamily="34" charset="-122"/>
+                <a:ea typeface="微软雅黑" panose="020B0503020204020204" pitchFamily="34" charset="-122"/>
+              </a:rPr>
+              <a:t>分布越均匀保留的信息越多</a:t>
+            </a:r>
+            <a:r>
+              <a:rPr lang="zh-CN" altLang="en-US" dirty="0">
+                <a:latin typeface="微软雅黑" panose="020B0503020204020204" pitchFamily="34" charset="-122"/>
+                <a:ea typeface="微软雅黑" panose="020B0503020204020204" pitchFamily="34" charset="-122"/>
+              </a:rPr>
+              <a:t>）</a:t>
+            </a:r>
+          </a:p>
+        </p:txBody>
+      </p:sp>
+    </p:spTree>
+    <p:extLst>
+      <p:ext uri="{BB962C8B-B14F-4D97-AF65-F5344CB8AC3E}">
+        <p14:creationId xmlns:p14="http://schemas.microsoft.com/office/powerpoint/2010/main" val="2658957211"/>
+      </p:ext>
+    </p:extLst>
+  </p:cSld>
+  <p:clrMapOvr>
+    <a:masterClrMapping/>
+  </p:clrMapOvr>
+</p:sld>
+</file>
+
 <file path=ppt/theme/theme1.xml><?xml version="1.0" encoding="utf-8"?>
 <a:theme xmlns:a="http://schemas.openxmlformats.org/drawingml/2006/main" name="Office 主题​​">
   <a:themeElements>

</xml_diff>